<commit_message>
Adição da classe PaginaCliente no diagrama de classes
</commit_message>
<xml_diff>
--- a/Documentos/DiagramaClasses.pptx
+++ b/Documentos/DiagramaClasses.pptx
@@ -3103,7 +3103,7 @@
         </p:nvSpPr>
         <p:spPr>
           <a:xfrm>
-            <a:off x="2419113" y="2662740"/>
+            <a:off x="683568" y="574508"/>
             <a:ext cx="2304256" cy="261610"/>
           </a:xfrm>
           <a:prstGeom prst="rect">
@@ -3138,7 +3138,7 @@
         </p:nvSpPr>
         <p:spPr>
           <a:xfrm>
-            <a:off x="2419113" y="2924944"/>
+            <a:off x="683568" y="836712"/>
             <a:ext cx="2304256" cy="769441"/>
           </a:xfrm>
           <a:prstGeom prst="rect">
@@ -3190,7 +3190,7 @@
         </p:nvSpPr>
         <p:spPr>
           <a:xfrm>
-            <a:off x="2419113" y="3697274"/>
+            <a:off x="683568" y="1609042"/>
             <a:ext cx="2304256" cy="261610"/>
           </a:xfrm>
           <a:prstGeom prst="rect">
@@ -3227,7 +3227,7 @@
         </p:nvCxnSpPr>
         <p:spPr>
           <a:xfrm>
-            <a:off x="4723369" y="2793545"/>
+            <a:off x="2987824" y="705313"/>
             <a:ext cx="1296144" cy="0"/>
           </a:xfrm>
           <a:prstGeom prst="line">
@@ -3257,7 +3257,7 @@
         </p:nvSpPr>
         <p:spPr>
           <a:xfrm>
-            <a:off x="6026866" y="2668927"/>
+            <a:off x="4291321" y="580695"/>
             <a:ext cx="288032" cy="274821"/>
           </a:xfrm>
           <a:prstGeom prst="ellipse">
@@ -3300,7 +3300,7 @@
         </p:nvSpPr>
         <p:spPr>
           <a:xfrm>
-            <a:off x="5786897" y="3046728"/>
+            <a:off x="4051352" y="958496"/>
             <a:ext cx="785793" cy="261610"/>
           </a:xfrm>
           <a:prstGeom prst="rect">
@@ -3322,6 +3322,226 @@
           </a:p>
         </p:txBody>
       </p:sp>
+      <p:sp>
+        <p:nvSpPr>
+          <p:cNvPr id="13" name="TextBox 12"/>
+          <p:cNvSpPr txBox="1"/>
+          <p:nvPr/>
+        </p:nvSpPr>
+        <p:spPr>
+          <a:xfrm>
+            <a:off x="5796136" y="2276872"/>
+            <a:ext cx="2304256" cy="261610"/>
+          </a:xfrm>
+          <a:prstGeom prst="rect">
+            <a:avLst/>
+          </a:prstGeom>
+          <a:noFill/>
+          <a:ln w="25400">
+            <a:solidFill>
+              <a:schemeClr val="tx2"/>
+            </a:solidFill>
+          </a:ln>
+        </p:spPr>
+        <p:txBody>
+          <a:bodyPr wrap="square" rtlCol="0">
+            <a:spAutoFit/>
+          </a:bodyPr>
+          <a:lstStyle/>
+          <a:p>
+            <a:r>
+              <a:rPr lang="pt-BR" sz="1100" dirty="0" smtClean="0"/>
+              <a:t>PaginaCliente</a:t>
+            </a:r>
+            <a:endParaRPr lang="pt-BR" sz="1100" dirty="0"/>
+          </a:p>
+        </p:txBody>
+      </p:sp>
+      <p:sp>
+        <p:nvSpPr>
+          <p:cNvPr id="14" name="TextBox 13"/>
+          <p:cNvSpPr txBox="1"/>
+          <p:nvPr/>
+        </p:nvSpPr>
+        <p:spPr>
+          <a:xfrm>
+            <a:off x="5796136" y="2539076"/>
+            <a:ext cx="2304256" cy="938719"/>
+          </a:xfrm>
+          <a:prstGeom prst="rect">
+            <a:avLst/>
+          </a:prstGeom>
+          <a:noFill/>
+          <a:ln w="25400">
+            <a:solidFill>
+              <a:schemeClr val="tx2"/>
+            </a:solidFill>
+          </a:ln>
+        </p:spPr>
+        <p:txBody>
+          <a:bodyPr wrap="square" rtlCol="0">
+            <a:spAutoFit/>
+          </a:bodyPr>
+          <a:lstStyle/>
+          <a:p>
+            <a:r>
+              <a:rPr lang="pt-BR" sz="1100" dirty="0" smtClean="0"/>
+              <a:t>- nomeSite: String</a:t>
+            </a:r>
+          </a:p>
+          <a:p>
+            <a:r>
+              <a:rPr lang="pt-BR" sz="1100" dirty="0" smtClean="0"/>
+              <a:t>- tituloSite: String</a:t>
+            </a:r>
+          </a:p>
+          <a:p>
+            <a:r>
+              <a:rPr lang="pt-BR" sz="1100" dirty="0" smtClean="0"/>
+              <a:t>- bannerSite: String</a:t>
+            </a:r>
+          </a:p>
+          <a:p>
+            <a:r>
+              <a:rPr lang="pt-BR" sz="1100" dirty="0" smtClean="0"/>
+              <a:t>- noduloSite: int[]</a:t>
+            </a:r>
+          </a:p>
+          <a:p>
+            <a:r>
+              <a:rPr lang="pt-BR" sz="1100" dirty="0" smtClean="0"/>
+              <a:t>- layoutSite: int</a:t>
+            </a:r>
+          </a:p>
+        </p:txBody>
+      </p:sp>
+      <p:sp>
+        <p:nvSpPr>
+          <p:cNvPr id="15" name="TextBox 14"/>
+          <p:cNvSpPr txBox="1"/>
+          <p:nvPr/>
+        </p:nvSpPr>
+        <p:spPr>
+          <a:xfrm>
+            <a:off x="5796136" y="3483130"/>
+            <a:ext cx="2304256" cy="1785104"/>
+          </a:xfrm>
+          <a:prstGeom prst="rect">
+            <a:avLst/>
+          </a:prstGeom>
+          <a:noFill/>
+          <a:ln w="25400">
+            <a:solidFill>
+              <a:schemeClr val="tx2"/>
+            </a:solidFill>
+          </a:ln>
+        </p:spPr>
+        <p:txBody>
+          <a:bodyPr wrap="square" rtlCol="0">
+            <a:spAutoFit/>
+          </a:bodyPr>
+          <a:lstStyle/>
+          <a:p>
+            <a:r>
+              <a:rPr lang="pt-BR" sz="1100" dirty="0" smtClean="0"/>
+              <a:t>+ getNomeSite(): String</a:t>
+            </a:r>
+          </a:p>
+          <a:p>
+            <a:r>
+              <a:rPr lang="pt-BR" sz="1100" dirty="0" smtClean="0"/>
+              <a:t>+ setNomeSite(String): void</a:t>
+            </a:r>
+          </a:p>
+          <a:p>
+            <a:r>
+              <a:rPr lang="pt-BR" sz="1100" dirty="0" smtClean="0"/>
+              <a:t>+ getTituloSite(): String</a:t>
+            </a:r>
+          </a:p>
+          <a:p>
+            <a:r>
+              <a:rPr lang="pt-BR" sz="1100" dirty="0" smtClean="0"/>
+              <a:t>+ setTituloSite(String): void</a:t>
+            </a:r>
+          </a:p>
+          <a:p>
+            <a:r>
+              <a:rPr lang="pt-BR" sz="1100" dirty="0" smtClean="0"/>
+              <a:t>+ getBannerSite(): String</a:t>
+            </a:r>
+          </a:p>
+          <a:p>
+            <a:r>
+              <a:rPr lang="pt-BR" sz="1100" dirty="0" smtClean="0"/>
+              <a:t>+ setBannerSite(String): void</a:t>
+            </a:r>
+          </a:p>
+          <a:p>
+            <a:r>
+              <a:rPr lang="pt-BR" sz="1100" dirty="0" smtClean="0"/>
+              <a:t>+ getModuloSite(int): int</a:t>
+            </a:r>
+          </a:p>
+          <a:p>
+            <a:r>
+              <a:rPr lang="pt-BR" sz="1100" dirty="0" smtClean="0"/>
+              <a:t>+ setModuloSite(String): void</a:t>
+            </a:r>
+          </a:p>
+          <a:p>
+            <a:r>
+              <a:rPr lang="pt-BR" sz="1100" dirty="0" smtClean="0"/>
+              <a:t>+ getLayoutSite(): String</a:t>
+            </a:r>
+          </a:p>
+          <a:p>
+            <a:r>
+              <a:rPr lang="pt-BR" sz="1100" dirty="0" smtClean="0"/>
+              <a:t>+ setLayoutSite(int): void</a:t>
+            </a:r>
+          </a:p>
+        </p:txBody>
+      </p:sp>
+      <p:cxnSp>
+        <p:nvCxnSpPr>
+          <p:cNvPr id="21" name="Elbow Connector 20"/>
+          <p:cNvCxnSpPr>
+            <a:stCxn id="13" idx="1"/>
+            <a:endCxn id="5" idx="1"/>
+          </p:cNvCxnSpPr>
+          <p:nvPr/>
+        </p:nvCxnSpPr>
+        <p:spPr>
+          <a:xfrm rot="10800000">
+            <a:off x="683568" y="705313"/>
+            <a:ext cx="5112568" cy="1702364"/>
+          </a:xfrm>
+          <a:prstGeom prst="bentConnector3">
+            <a:avLst>
+              <a:gd name="adj1" fmla="val 104471"/>
+            </a:avLst>
+          </a:prstGeom>
+          <a:ln>
+            <a:prstDash val="dash"/>
+            <a:tailEnd type="arrow"/>
+          </a:ln>
+        </p:spPr>
+        <p:style>
+          <a:lnRef idx="1">
+            <a:schemeClr val="accent1"/>
+          </a:lnRef>
+          <a:fillRef idx="0">
+            <a:schemeClr val="accent1"/>
+          </a:fillRef>
+          <a:effectRef idx="0">
+            <a:schemeClr val="accent1"/>
+          </a:effectRef>
+          <a:fontRef idx="minor">
+            <a:schemeClr val="tx1"/>
+          </a:fontRef>
+        </p:style>
+      </p:cxnSp>
     </p:spTree>
     <p:extLst>
       <p:ext uri="{BB962C8B-B14F-4D97-AF65-F5344CB8AC3E}">

</xml_diff>

<commit_message>
Novo diagrama de classe (Pronto para apresentação)
</commit_message>
<xml_diff>
--- a/Documentos/DiagramaClasses.pptx
+++ b/Documentos/DiagramaClasses.pptx
@@ -288,7 +288,7 @@
           <a:p>
             <a:fld id="{972BB82D-7999-4EDA-B13A-D3778869FCA8}" type="datetimeFigureOut">
               <a:rPr lang="pt-BR" smtClean="0"/>
-              <a:t>05/10/2010</a:t>
+              <a:t>06/10/2010</a:t>
             </a:fld>
             <a:endParaRPr lang="pt-BR"/>
           </a:p>
@@ -330,7 +330,7 @@
           <a:p>
             <a:fld id="{699359CA-A465-49DE-BC6C-8C6B4C1C563C}" type="slidenum">
               <a:rPr lang="pt-BR" smtClean="0"/>
-              <a:t>‹#›</a:t>
+              <a:t>‹nº›</a:t>
             </a:fld>
             <a:endParaRPr lang="pt-BR"/>
           </a:p>
@@ -458,7 +458,7 @@
           <a:p>
             <a:fld id="{972BB82D-7999-4EDA-B13A-D3778869FCA8}" type="datetimeFigureOut">
               <a:rPr lang="pt-BR" smtClean="0"/>
-              <a:t>05/10/2010</a:t>
+              <a:t>06/10/2010</a:t>
             </a:fld>
             <a:endParaRPr lang="pt-BR"/>
           </a:p>
@@ -500,7 +500,7 @@
           <a:p>
             <a:fld id="{699359CA-A465-49DE-BC6C-8C6B4C1C563C}" type="slidenum">
               <a:rPr lang="pt-BR" smtClean="0"/>
-              <a:t>‹#›</a:t>
+              <a:t>‹nº›</a:t>
             </a:fld>
             <a:endParaRPr lang="pt-BR"/>
           </a:p>
@@ -638,7 +638,7 @@
           <a:p>
             <a:fld id="{972BB82D-7999-4EDA-B13A-D3778869FCA8}" type="datetimeFigureOut">
               <a:rPr lang="pt-BR" smtClean="0"/>
-              <a:t>05/10/2010</a:t>
+              <a:t>06/10/2010</a:t>
             </a:fld>
             <a:endParaRPr lang="pt-BR"/>
           </a:p>
@@ -680,7 +680,7 @@
           <a:p>
             <a:fld id="{699359CA-A465-49DE-BC6C-8C6B4C1C563C}" type="slidenum">
               <a:rPr lang="pt-BR" smtClean="0"/>
-              <a:t>‹#›</a:t>
+              <a:t>‹nº›</a:t>
             </a:fld>
             <a:endParaRPr lang="pt-BR"/>
           </a:p>
@@ -808,7 +808,7 @@
           <a:p>
             <a:fld id="{972BB82D-7999-4EDA-B13A-D3778869FCA8}" type="datetimeFigureOut">
               <a:rPr lang="pt-BR" smtClean="0"/>
-              <a:t>05/10/2010</a:t>
+              <a:t>06/10/2010</a:t>
             </a:fld>
             <a:endParaRPr lang="pt-BR"/>
           </a:p>
@@ -850,7 +850,7 @@
           <a:p>
             <a:fld id="{699359CA-A465-49DE-BC6C-8C6B4C1C563C}" type="slidenum">
               <a:rPr lang="pt-BR" smtClean="0"/>
-              <a:t>‹#›</a:t>
+              <a:t>‹nº›</a:t>
             </a:fld>
             <a:endParaRPr lang="pt-BR"/>
           </a:p>
@@ -1054,7 +1054,7 @@
           <a:p>
             <a:fld id="{972BB82D-7999-4EDA-B13A-D3778869FCA8}" type="datetimeFigureOut">
               <a:rPr lang="pt-BR" smtClean="0"/>
-              <a:t>05/10/2010</a:t>
+              <a:t>06/10/2010</a:t>
             </a:fld>
             <a:endParaRPr lang="pt-BR"/>
           </a:p>
@@ -1096,7 +1096,7 @@
           <a:p>
             <a:fld id="{699359CA-A465-49DE-BC6C-8C6B4C1C563C}" type="slidenum">
               <a:rPr lang="pt-BR" smtClean="0"/>
-              <a:t>‹#›</a:t>
+              <a:t>‹nº›</a:t>
             </a:fld>
             <a:endParaRPr lang="pt-BR"/>
           </a:p>
@@ -1342,7 +1342,7 @@
           <a:p>
             <a:fld id="{972BB82D-7999-4EDA-B13A-D3778869FCA8}" type="datetimeFigureOut">
               <a:rPr lang="pt-BR" smtClean="0"/>
-              <a:t>05/10/2010</a:t>
+              <a:t>06/10/2010</a:t>
             </a:fld>
             <a:endParaRPr lang="pt-BR"/>
           </a:p>
@@ -1384,7 +1384,7 @@
           <a:p>
             <a:fld id="{699359CA-A465-49DE-BC6C-8C6B4C1C563C}" type="slidenum">
               <a:rPr lang="pt-BR" smtClean="0"/>
-              <a:t>‹#›</a:t>
+              <a:t>‹nº›</a:t>
             </a:fld>
             <a:endParaRPr lang="pt-BR"/>
           </a:p>
@@ -1764,7 +1764,7 @@
           <a:p>
             <a:fld id="{972BB82D-7999-4EDA-B13A-D3778869FCA8}" type="datetimeFigureOut">
               <a:rPr lang="pt-BR" smtClean="0"/>
-              <a:t>05/10/2010</a:t>
+              <a:t>06/10/2010</a:t>
             </a:fld>
             <a:endParaRPr lang="pt-BR"/>
           </a:p>
@@ -1806,7 +1806,7 @@
           <a:p>
             <a:fld id="{699359CA-A465-49DE-BC6C-8C6B4C1C563C}" type="slidenum">
               <a:rPr lang="pt-BR" smtClean="0"/>
-              <a:t>‹#›</a:t>
+              <a:t>‹nº›</a:t>
             </a:fld>
             <a:endParaRPr lang="pt-BR"/>
           </a:p>
@@ -1882,7 +1882,7 @@
           <a:p>
             <a:fld id="{972BB82D-7999-4EDA-B13A-D3778869FCA8}" type="datetimeFigureOut">
               <a:rPr lang="pt-BR" smtClean="0"/>
-              <a:t>05/10/2010</a:t>
+              <a:t>06/10/2010</a:t>
             </a:fld>
             <a:endParaRPr lang="pt-BR"/>
           </a:p>
@@ -1924,7 +1924,7 @@
           <a:p>
             <a:fld id="{699359CA-A465-49DE-BC6C-8C6B4C1C563C}" type="slidenum">
               <a:rPr lang="pt-BR" smtClean="0"/>
-              <a:t>‹#›</a:t>
+              <a:t>‹nº›</a:t>
             </a:fld>
             <a:endParaRPr lang="pt-BR"/>
           </a:p>
@@ -1977,7 +1977,7 @@
           <a:p>
             <a:fld id="{972BB82D-7999-4EDA-B13A-D3778869FCA8}" type="datetimeFigureOut">
               <a:rPr lang="pt-BR" smtClean="0"/>
-              <a:t>05/10/2010</a:t>
+              <a:t>06/10/2010</a:t>
             </a:fld>
             <a:endParaRPr lang="pt-BR"/>
           </a:p>
@@ -2019,7 +2019,7 @@
           <a:p>
             <a:fld id="{699359CA-A465-49DE-BC6C-8C6B4C1C563C}" type="slidenum">
               <a:rPr lang="pt-BR" smtClean="0"/>
-              <a:t>‹#›</a:t>
+              <a:t>‹nº›</a:t>
             </a:fld>
             <a:endParaRPr lang="pt-BR"/>
           </a:p>
@@ -2254,7 +2254,7 @@
           <a:p>
             <a:fld id="{972BB82D-7999-4EDA-B13A-D3778869FCA8}" type="datetimeFigureOut">
               <a:rPr lang="pt-BR" smtClean="0"/>
-              <a:t>05/10/2010</a:t>
+              <a:t>06/10/2010</a:t>
             </a:fld>
             <a:endParaRPr lang="pt-BR"/>
           </a:p>
@@ -2296,7 +2296,7 @@
           <a:p>
             <a:fld id="{699359CA-A465-49DE-BC6C-8C6B4C1C563C}" type="slidenum">
               <a:rPr lang="pt-BR" smtClean="0"/>
-              <a:t>‹#›</a:t>
+              <a:t>‹nº›</a:t>
             </a:fld>
             <a:endParaRPr lang="pt-BR"/>
           </a:p>
@@ -2507,7 +2507,7 @@
           <a:p>
             <a:fld id="{972BB82D-7999-4EDA-B13A-D3778869FCA8}" type="datetimeFigureOut">
               <a:rPr lang="pt-BR" smtClean="0"/>
-              <a:t>05/10/2010</a:t>
+              <a:t>06/10/2010</a:t>
             </a:fld>
             <a:endParaRPr lang="pt-BR"/>
           </a:p>
@@ -2549,7 +2549,7 @@
           <a:p>
             <a:fld id="{699359CA-A465-49DE-BC6C-8C6B4C1C563C}" type="slidenum">
               <a:rPr lang="pt-BR" smtClean="0"/>
-              <a:t>‹#›</a:t>
+              <a:t>‹nº›</a:t>
             </a:fld>
             <a:endParaRPr lang="pt-BR"/>
           </a:p>
@@ -2720,7 +2720,7 @@
           <a:p>
             <a:fld id="{972BB82D-7999-4EDA-B13A-D3778869FCA8}" type="datetimeFigureOut">
               <a:rPr lang="pt-BR" smtClean="0"/>
-              <a:t>05/10/2010</a:t>
+              <a:t>06/10/2010</a:t>
             </a:fld>
             <a:endParaRPr lang="pt-BR"/>
           </a:p>
@@ -2798,7 +2798,7 @@
           <a:p>
             <a:fld id="{699359CA-A465-49DE-BC6C-8C6B4C1C563C}" type="slidenum">
               <a:rPr lang="pt-BR" smtClean="0"/>
-              <a:t>‹#›</a:t>
+              <a:t>‹nº›</a:t>
             </a:fld>
             <a:endParaRPr lang="pt-BR"/>
           </a:p>
@@ -3103,7 +3103,7 @@
         </p:nvSpPr>
         <p:spPr>
           <a:xfrm>
-            <a:off x="683568" y="574508"/>
+            <a:off x="1699692" y="574508"/>
             <a:ext cx="2304256" cy="261610"/>
           </a:xfrm>
           <a:prstGeom prst="rect">
@@ -3138,8 +3138,8 @@
         </p:nvSpPr>
         <p:spPr>
           <a:xfrm>
-            <a:off x="683568" y="836712"/>
-            <a:ext cx="2304256" cy="769441"/>
+            <a:off x="1699692" y="836712"/>
+            <a:ext cx="2304256" cy="4324261"/>
           </a:xfrm>
           <a:prstGeom prst="rect">
             <a:avLst/>
@@ -3158,27 +3158,374 @@
           <a:lstStyle/>
           <a:p>
             <a:r>
-              <a:rPr lang="pt-BR" sz="1100" dirty="0" smtClean="0"/>
-              <a:t>- mainPanel: VerticalPanel</a:t>
-            </a:r>
-          </a:p>
-          <a:p>
-            <a:r>
-              <a:rPr lang="pt-BR" sz="1100" dirty="0" smtClean="0"/>
-              <a:t>- stocksFlaxTable: FlexTable</a:t>
-            </a:r>
-          </a:p>
-          <a:p>
-            <a:r>
-              <a:rPr lang="pt-BR" sz="1100" dirty="0" smtClean="0"/>
-              <a:t>- addPanel: HorizontalPanel</a:t>
-            </a:r>
-          </a:p>
-          <a:p>
-            <a:r>
-              <a:rPr lang="pt-BR" sz="1100" dirty="0" smtClean="0"/>
-              <a:t>- lastUpdateLabel: Label</a:t>
-            </a:r>
+              <a:rPr lang="pt-BR" sz="1100" dirty="0"/>
+              <a:t>- </a:t>
+            </a:r>
+            <a:r>
+              <a:rPr lang="pt-BR" sz="1100" dirty="0" err="1"/>
+              <a:t>pagCliente</a:t>
+            </a:r>
+            <a:r>
+              <a:rPr lang="pt-BR" sz="1100" dirty="0"/>
+              <a:t> : </a:t>
+            </a:r>
+            <a:r>
+              <a:rPr lang="pt-BR" sz="1100" dirty="0" err="1"/>
+              <a:t>PaginaCliente</a:t>
+            </a:r>
+            <a:endParaRPr lang="pt-BR" sz="1100" dirty="0"/>
+          </a:p>
+          <a:p>
+            <a:r>
+              <a:rPr lang="pt-BR" sz="1100" dirty="0"/>
+              <a:t>- </a:t>
+            </a:r>
+            <a:r>
+              <a:rPr lang="pt-BR" sz="1100" dirty="0" err="1"/>
+              <a:t>mainPanel</a:t>
+            </a:r>
+            <a:r>
+              <a:rPr lang="pt-BR" sz="1100" dirty="0"/>
+              <a:t> : </a:t>
+            </a:r>
+            <a:r>
+              <a:rPr lang="pt-BR" sz="1100" dirty="0" err="1"/>
+              <a:t>VerticalPanel</a:t>
+            </a:r>
+            <a:endParaRPr lang="pt-BR" sz="1100" dirty="0"/>
+          </a:p>
+          <a:p>
+            <a:r>
+              <a:rPr lang="pt-BR" sz="1100" dirty="0"/>
+              <a:t>- </a:t>
+            </a:r>
+            <a:r>
+              <a:rPr lang="pt-BR" sz="1100" dirty="0" err="1"/>
+              <a:t>stocksFlexTable</a:t>
+            </a:r>
+            <a:r>
+              <a:rPr lang="pt-BR" sz="1100" dirty="0"/>
+              <a:t> : </a:t>
+            </a:r>
+            <a:r>
+              <a:rPr lang="pt-BR" sz="1100" dirty="0" err="1"/>
+              <a:t>FlexTable</a:t>
+            </a:r>
+            <a:endParaRPr lang="pt-BR" sz="1100" dirty="0"/>
+          </a:p>
+          <a:p>
+            <a:r>
+              <a:rPr lang="pt-BR" sz="1100" dirty="0"/>
+              <a:t>- </a:t>
+            </a:r>
+            <a:r>
+              <a:rPr lang="pt-BR" sz="1100" dirty="0" err="1"/>
+              <a:t>addPanel</a:t>
+            </a:r>
+            <a:r>
+              <a:rPr lang="pt-BR" sz="1100" dirty="0"/>
+              <a:t> : </a:t>
+            </a:r>
+            <a:r>
+              <a:rPr lang="pt-BR" sz="1100" dirty="0" err="1"/>
+              <a:t>HorizontalPanel</a:t>
+            </a:r>
+            <a:endParaRPr lang="pt-BR" sz="1100" dirty="0"/>
+          </a:p>
+          <a:p>
+            <a:r>
+              <a:rPr lang="pt-BR" sz="1100" dirty="0"/>
+              <a:t>- </a:t>
+            </a:r>
+            <a:r>
+              <a:rPr lang="pt-BR" sz="1100" dirty="0" err="1"/>
+              <a:t>lastUpdatedLabel</a:t>
+            </a:r>
+            <a:r>
+              <a:rPr lang="pt-BR" sz="1100" dirty="0"/>
+              <a:t> : </a:t>
+            </a:r>
+            <a:r>
+              <a:rPr lang="pt-BR" sz="1100" dirty="0" err="1"/>
+              <a:t>Label</a:t>
+            </a:r>
+            <a:endParaRPr lang="pt-BR" sz="1100" dirty="0"/>
+          </a:p>
+          <a:p>
+            <a:r>
+              <a:rPr lang="pt-BR" sz="1100" dirty="0"/>
+              <a:t>- </a:t>
+            </a:r>
+            <a:r>
+              <a:rPr lang="pt-BR" sz="1100" dirty="0" err="1"/>
+              <a:t>guardaDadosPrinc</a:t>
+            </a:r>
+            <a:r>
+              <a:rPr lang="pt-BR" sz="1100" dirty="0"/>
+              <a:t> : Button</a:t>
+            </a:r>
+          </a:p>
+          <a:p>
+            <a:r>
+              <a:rPr lang="pt-BR" sz="1100" dirty="0"/>
+              <a:t>- </a:t>
+            </a:r>
+            <a:r>
+              <a:rPr lang="pt-BR" sz="1100" dirty="0" err="1"/>
+              <a:t>limpaDadosPrinc</a:t>
+            </a:r>
+            <a:r>
+              <a:rPr lang="pt-BR" sz="1100" dirty="0"/>
+              <a:t> : Button</a:t>
+            </a:r>
+          </a:p>
+          <a:p>
+            <a:r>
+              <a:rPr lang="pt-BR" sz="1100" dirty="0"/>
+              <a:t>- </a:t>
+            </a:r>
+            <a:r>
+              <a:rPr lang="pt-BR" sz="1100" dirty="0" err="1"/>
+              <a:t>uploadBanner</a:t>
+            </a:r>
+            <a:r>
+              <a:rPr lang="pt-BR" sz="1100" dirty="0"/>
+              <a:t> : Button</a:t>
+            </a:r>
+          </a:p>
+          <a:p>
+            <a:r>
+              <a:rPr lang="pt-BR" sz="1100" dirty="0"/>
+              <a:t>- </a:t>
+            </a:r>
+            <a:r>
+              <a:rPr lang="pt-BR" sz="1100" dirty="0" err="1"/>
+              <a:t>guardaModulos</a:t>
+            </a:r>
+            <a:r>
+              <a:rPr lang="pt-BR" sz="1100" dirty="0"/>
+              <a:t> : Button</a:t>
+            </a:r>
+          </a:p>
+          <a:p>
+            <a:r>
+              <a:rPr lang="pt-BR" sz="1100" dirty="0"/>
+              <a:t>- </a:t>
+            </a:r>
+            <a:r>
+              <a:rPr lang="pt-BR" sz="1100" dirty="0" err="1"/>
+              <a:t>limpaModulos</a:t>
+            </a:r>
+            <a:r>
+              <a:rPr lang="pt-BR" sz="1100" dirty="0"/>
+              <a:t> : Button</a:t>
+            </a:r>
+          </a:p>
+          <a:p>
+            <a:r>
+              <a:rPr lang="pt-BR" sz="1100" dirty="0"/>
+              <a:t>- </a:t>
+            </a:r>
+            <a:r>
+              <a:rPr lang="pt-BR" sz="1100" dirty="0" err="1"/>
+              <a:t>guardaLayout</a:t>
+            </a:r>
+            <a:r>
+              <a:rPr lang="pt-BR" sz="1100" dirty="0"/>
+              <a:t> : Button</a:t>
+            </a:r>
+          </a:p>
+          <a:p>
+            <a:r>
+              <a:rPr lang="pt-BR" sz="1100" dirty="0"/>
+              <a:t>- </a:t>
+            </a:r>
+            <a:r>
+              <a:rPr lang="pt-BR" sz="1100" dirty="0" err="1"/>
+              <a:t>visualizaPagina</a:t>
+            </a:r>
+            <a:r>
+              <a:rPr lang="pt-BR" sz="1100" dirty="0"/>
+              <a:t> : Button</a:t>
+            </a:r>
+          </a:p>
+          <a:p>
+            <a:r>
+              <a:rPr lang="pt-BR" sz="1100" dirty="0"/>
+              <a:t>- </a:t>
+            </a:r>
+            <a:r>
+              <a:rPr lang="pt-BR" sz="1100" dirty="0" err="1"/>
+              <a:t>criaPagina</a:t>
+            </a:r>
+            <a:r>
+              <a:rPr lang="pt-BR" sz="1100" dirty="0"/>
+              <a:t> : Button</a:t>
+            </a:r>
+          </a:p>
+          <a:p>
+            <a:r>
+              <a:rPr lang="pt-BR" sz="1100" dirty="0"/>
+              <a:t>- </a:t>
+            </a:r>
+            <a:r>
+              <a:rPr lang="pt-BR" sz="1100" dirty="0" err="1"/>
+              <a:t>caixaNomeSite</a:t>
+            </a:r>
+            <a:r>
+              <a:rPr lang="pt-BR" sz="1100" dirty="0"/>
+              <a:t> : </a:t>
+            </a:r>
+            <a:r>
+              <a:rPr lang="pt-BR" sz="1100" dirty="0" err="1"/>
+              <a:t>TextBox</a:t>
+            </a:r>
+            <a:endParaRPr lang="pt-BR" sz="1100" dirty="0"/>
+          </a:p>
+          <a:p>
+            <a:r>
+              <a:rPr lang="pt-BR" sz="1100" dirty="0"/>
+              <a:t>- </a:t>
+            </a:r>
+            <a:r>
+              <a:rPr lang="pt-BR" sz="1100" dirty="0" err="1"/>
+              <a:t>caixaTituloSite</a:t>
+            </a:r>
+            <a:r>
+              <a:rPr lang="pt-BR" sz="1100" dirty="0"/>
+              <a:t> : </a:t>
+            </a:r>
+            <a:r>
+              <a:rPr lang="pt-BR" sz="1100" dirty="0" err="1"/>
+              <a:t>TextBox</a:t>
+            </a:r>
+            <a:endParaRPr lang="pt-BR" sz="1100" dirty="0"/>
+          </a:p>
+          <a:p>
+            <a:r>
+              <a:rPr lang="pt-BR" sz="1100" dirty="0"/>
+              <a:t>- </a:t>
+            </a:r>
+            <a:r>
+              <a:rPr lang="pt-BR" sz="1100" dirty="0" err="1"/>
+              <a:t>caixaBannerSite</a:t>
+            </a:r>
+            <a:r>
+              <a:rPr lang="pt-BR" sz="1100" dirty="0"/>
+              <a:t> : </a:t>
+            </a:r>
+            <a:r>
+              <a:rPr lang="pt-BR" sz="1100" dirty="0" err="1"/>
+              <a:t>TextBox</a:t>
+            </a:r>
+            <a:endParaRPr lang="pt-BR" sz="1100" dirty="0"/>
+          </a:p>
+          <a:p>
+            <a:r>
+              <a:rPr lang="pt-BR" sz="1100" dirty="0"/>
+              <a:t>- checkOpc1 : </a:t>
+            </a:r>
+            <a:r>
+              <a:rPr lang="pt-BR" sz="1100" dirty="0" err="1"/>
+              <a:t>CheckBox</a:t>
+            </a:r>
+            <a:endParaRPr lang="pt-BR" sz="1100" dirty="0"/>
+          </a:p>
+          <a:p>
+            <a:r>
+              <a:rPr lang="pt-BR" sz="1100" dirty="0"/>
+              <a:t>- checkOpc2 : </a:t>
+            </a:r>
+            <a:r>
+              <a:rPr lang="pt-BR" sz="1100" dirty="0" err="1"/>
+              <a:t>CheckBox</a:t>
+            </a:r>
+            <a:endParaRPr lang="pt-BR" sz="1100" dirty="0"/>
+          </a:p>
+          <a:p>
+            <a:r>
+              <a:rPr lang="pt-BR" sz="1100" dirty="0"/>
+              <a:t>- checkOpc3 : </a:t>
+            </a:r>
+            <a:r>
+              <a:rPr lang="pt-BR" sz="1100" dirty="0" err="1"/>
+              <a:t>CheckBox</a:t>
+            </a:r>
+            <a:endParaRPr lang="pt-BR" sz="1100" dirty="0"/>
+          </a:p>
+          <a:p>
+            <a:r>
+              <a:rPr lang="pt-BR" sz="1100" dirty="0"/>
+              <a:t>- checkOpc4 : </a:t>
+            </a:r>
+            <a:r>
+              <a:rPr lang="pt-BR" sz="1100" dirty="0" err="1"/>
+              <a:t>CheckBox</a:t>
+            </a:r>
+            <a:endParaRPr lang="pt-BR" sz="1100" dirty="0"/>
+          </a:p>
+          <a:p>
+            <a:r>
+              <a:rPr lang="pt-BR" sz="1100" dirty="0"/>
+              <a:t>- radioOpc1 : </a:t>
+            </a:r>
+            <a:r>
+              <a:rPr lang="pt-BR" sz="1100" dirty="0" err="1"/>
+              <a:t>RadioButton</a:t>
+            </a:r>
+            <a:endParaRPr lang="pt-BR" sz="1100" dirty="0"/>
+          </a:p>
+          <a:p>
+            <a:r>
+              <a:rPr lang="pt-BR" sz="1100" dirty="0"/>
+              <a:t>- radioOpc2 : </a:t>
+            </a:r>
+            <a:r>
+              <a:rPr lang="pt-BR" sz="1100" dirty="0" err="1"/>
+              <a:t>RadioButton</a:t>
+            </a:r>
+            <a:endParaRPr lang="pt-BR" sz="1100" dirty="0"/>
+          </a:p>
+          <a:p>
+            <a:r>
+              <a:rPr lang="pt-BR" sz="1100" dirty="0"/>
+              <a:t>- radioOpc3 : </a:t>
+            </a:r>
+            <a:r>
+              <a:rPr lang="pt-BR" sz="1100" dirty="0" err="1"/>
+              <a:t>RadioButton</a:t>
+            </a:r>
+            <a:endParaRPr lang="pt-BR" sz="1100" dirty="0"/>
+          </a:p>
+          <a:p>
+            <a:r>
+              <a:rPr lang="pt-BR" sz="1100" dirty="0"/>
+              <a:t>- radioOpc4 : </a:t>
+            </a:r>
+            <a:r>
+              <a:rPr lang="pt-BR" sz="1100" dirty="0" err="1"/>
+              <a:t>RadioButton</a:t>
+            </a:r>
+            <a:endParaRPr lang="pt-BR" sz="1100" dirty="0"/>
+          </a:p>
+          <a:p>
+            <a:r>
+              <a:rPr lang="pt-BR" sz="1100" dirty="0"/>
+              <a:t>- </a:t>
+            </a:r>
+            <a:r>
+              <a:rPr lang="pt-BR" sz="1100" dirty="0" err="1"/>
+              <a:t>tabPanel</a:t>
+            </a:r>
+            <a:r>
+              <a:rPr lang="pt-BR" sz="1100" dirty="0"/>
+              <a:t> : </a:t>
+            </a:r>
+            <a:r>
+              <a:rPr lang="pt-BR" sz="1100" dirty="0" err="1"/>
+              <a:t>TabPanel</a:t>
+            </a:r>
+            <a:endParaRPr lang="pt-BR" sz="1100" dirty="0" smtClean="0"/>
           </a:p>
         </p:txBody>
       </p:sp>
@@ -3190,7 +3537,7 @@
         </p:nvSpPr>
         <p:spPr>
           <a:xfrm>
-            <a:off x="683568" y="1609042"/>
+            <a:off x="1699692" y="5160973"/>
             <a:ext cx="2304256" cy="261610"/>
           </a:xfrm>
           <a:prstGeom prst="rect">
@@ -3221,14 +3568,14 @@
         <p:nvCxnSpPr>
           <p:cNvPr id="9" name="Straight Connector 8"/>
           <p:cNvCxnSpPr>
-            <a:stCxn id="5" idx="3"/>
+            <a:endCxn id="5" idx="1"/>
           </p:cNvCxnSpPr>
           <p:nvPr/>
         </p:nvCxnSpPr>
         <p:spPr>
           <a:xfrm>
-            <a:off x="2987824" y="705313"/>
-            <a:ext cx="1296144" cy="0"/>
+            <a:off x="1060808" y="705313"/>
+            <a:ext cx="638884" cy="0"/>
           </a:xfrm>
           <a:prstGeom prst="line">
             <a:avLst/>
@@ -3257,7 +3604,7 @@
         </p:nvSpPr>
         <p:spPr>
           <a:xfrm>
-            <a:off x="4291321" y="580695"/>
+            <a:off x="772776" y="561297"/>
             <a:ext cx="288032" cy="274821"/>
           </a:xfrm>
           <a:prstGeom prst="ellipse">
@@ -3300,7 +3647,7 @@
         </p:nvSpPr>
         <p:spPr>
           <a:xfrm>
-            <a:off x="4051352" y="958496"/>
+            <a:off x="523895" y="959822"/>
             <a:ext cx="785793" cy="261610"/>
           </a:xfrm>
           <a:prstGeom prst="rect">
@@ -3330,7 +3677,7 @@
         </p:nvSpPr>
         <p:spPr>
           <a:xfrm>
-            <a:off x="5796136" y="2276872"/>
+            <a:off x="5796136" y="1308616"/>
             <a:ext cx="2304256" cy="261610"/>
           </a:xfrm>
           <a:prstGeom prst="rect">
@@ -3365,8 +3712,8 @@
         </p:nvSpPr>
         <p:spPr>
           <a:xfrm>
-            <a:off x="5796136" y="2539076"/>
-            <a:ext cx="2304256" cy="938719"/>
+            <a:off x="5796136" y="1579462"/>
+            <a:ext cx="2304256" cy="1446550"/>
           </a:xfrm>
           <a:prstGeom prst="rect">
             <a:avLst/>
@@ -3385,33 +3732,140 @@
           <a:lstStyle/>
           <a:p>
             <a:r>
-              <a:rPr lang="pt-BR" sz="1100" dirty="0" smtClean="0"/>
-              <a:t>- nomeSite: String</a:t>
-            </a:r>
-          </a:p>
-          <a:p>
-            <a:r>
-              <a:rPr lang="pt-BR" sz="1100" dirty="0" smtClean="0"/>
-              <a:t>- tituloSite: String</a:t>
-            </a:r>
-          </a:p>
-          <a:p>
-            <a:r>
-              <a:rPr lang="pt-BR" sz="1100" dirty="0" smtClean="0"/>
-              <a:t>- bannerSite: String</a:t>
-            </a:r>
-          </a:p>
-          <a:p>
-            <a:r>
-              <a:rPr lang="pt-BR" sz="1100" dirty="0" smtClean="0"/>
-              <a:t>- noduloSite: int[]</a:t>
-            </a:r>
-          </a:p>
-          <a:p>
-            <a:r>
-              <a:rPr lang="pt-BR" sz="1100" dirty="0" smtClean="0"/>
-              <a:t>- layoutSite: int</a:t>
-            </a:r>
+              <a:rPr lang="en-US" sz="1100" dirty="0"/>
+              <a:t>- </a:t>
+            </a:r>
+            <a:r>
+              <a:rPr lang="en-US" sz="1100" dirty="0" err="1"/>
+              <a:t>nomeSite</a:t>
+            </a:r>
+            <a:r>
+              <a:rPr lang="en-US" sz="1100" dirty="0"/>
+              <a:t> : String</a:t>
+            </a:r>
+          </a:p>
+          <a:p>
+            <a:r>
+              <a:rPr lang="en-US" sz="1100" dirty="0"/>
+              <a:t>- </a:t>
+            </a:r>
+            <a:r>
+              <a:rPr lang="en-US" sz="1100" dirty="0" err="1"/>
+              <a:t>tituloSite</a:t>
+            </a:r>
+            <a:r>
+              <a:rPr lang="en-US" sz="1100" dirty="0"/>
+              <a:t> : String</a:t>
+            </a:r>
+          </a:p>
+          <a:p>
+            <a:r>
+              <a:rPr lang="en-US" sz="1100" dirty="0"/>
+              <a:t>- </a:t>
+            </a:r>
+            <a:r>
+              <a:rPr lang="en-US" sz="1100" dirty="0" err="1"/>
+              <a:t>bannerSite</a:t>
+            </a:r>
+            <a:r>
+              <a:rPr lang="en-US" sz="1100" dirty="0"/>
+              <a:t> : String</a:t>
+            </a:r>
+          </a:p>
+          <a:p>
+            <a:r>
+              <a:rPr lang="en-US" sz="1100" dirty="0"/>
+              <a:t>- </a:t>
+            </a:r>
+            <a:r>
+              <a:rPr lang="en-US" sz="1100" dirty="0" err="1"/>
+              <a:t>graduacao</a:t>
+            </a:r>
+            <a:r>
+              <a:rPr lang="en-US" sz="1100" dirty="0"/>
+              <a:t> : </a:t>
+            </a:r>
+            <a:r>
+              <a:rPr lang="en-US" sz="1100" dirty="0" err="1"/>
+              <a:t>int</a:t>
+            </a:r>
+            <a:endParaRPr lang="en-US" sz="1100" dirty="0"/>
+          </a:p>
+          <a:p>
+            <a:r>
+              <a:rPr lang="en-US" sz="1100" dirty="0"/>
+              <a:t>- </a:t>
+            </a:r>
+            <a:r>
+              <a:rPr lang="en-US" sz="1100" dirty="0" err="1"/>
+              <a:t>posGraduacao</a:t>
+            </a:r>
+            <a:r>
+              <a:rPr lang="en-US" sz="1100" dirty="0"/>
+              <a:t> : </a:t>
+            </a:r>
+            <a:r>
+              <a:rPr lang="en-US" sz="1100" dirty="0" err="1"/>
+              <a:t>int</a:t>
+            </a:r>
+            <a:endParaRPr lang="en-US" sz="1100" dirty="0"/>
+          </a:p>
+          <a:p>
+            <a:r>
+              <a:rPr lang="en-US" sz="1100" dirty="0"/>
+              <a:t>- </a:t>
+            </a:r>
+            <a:r>
+              <a:rPr lang="en-US" sz="1100" dirty="0" err="1"/>
+              <a:t>mestrado</a:t>
+            </a:r>
+            <a:r>
+              <a:rPr lang="en-US" sz="1100" dirty="0"/>
+              <a:t> : </a:t>
+            </a:r>
+            <a:r>
+              <a:rPr lang="en-US" sz="1100" dirty="0" err="1"/>
+              <a:t>int</a:t>
+            </a:r>
+            <a:endParaRPr lang="en-US" sz="1100" dirty="0"/>
+          </a:p>
+          <a:p>
+            <a:r>
+              <a:rPr lang="en-US" sz="1100" dirty="0"/>
+              <a:t>- </a:t>
+            </a:r>
+            <a:r>
+              <a:rPr lang="en-US" sz="1100" dirty="0" err="1"/>
+              <a:t>doutorado</a:t>
+            </a:r>
+            <a:r>
+              <a:rPr lang="en-US" sz="1100" dirty="0"/>
+              <a:t> : </a:t>
+            </a:r>
+            <a:r>
+              <a:rPr lang="en-US" sz="1100" dirty="0" err="1"/>
+              <a:t>int</a:t>
+            </a:r>
+            <a:endParaRPr lang="en-US" sz="1100" dirty="0"/>
+          </a:p>
+          <a:p>
+            <a:r>
+              <a:rPr lang="en-US" sz="1100" dirty="0"/>
+              <a:t>- </a:t>
+            </a:r>
+            <a:r>
+              <a:rPr lang="en-US" sz="1100" dirty="0" err="1"/>
+              <a:t>layoutSite</a:t>
+            </a:r>
+            <a:r>
+              <a:rPr lang="en-US" sz="1100" dirty="0"/>
+              <a:t> : </a:t>
+            </a:r>
+            <a:r>
+              <a:rPr lang="en-US" sz="1100" dirty="0" err="1"/>
+              <a:t>int</a:t>
+            </a:r>
+            <a:endParaRPr lang="pt-BR" sz="1100" dirty="0" smtClean="0"/>
           </a:p>
         </p:txBody>
       </p:sp>
@@ -3423,8 +3877,8 @@
         </p:nvSpPr>
         <p:spPr>
           <a:xfrm>
-            <a:off x="5796136" y="3483130"/>
-            <a:ext cx="2304256" cy="1785104"/>
+            <a:off x="5796136" y="3026378"/>
+            <a:ext cx="2304256" cy="2970044"/>
           </a:xfrm>
           <a:prstGeom prst="rect">
             <a:avLst/>
@@ -3443,75 +3897,306 @@
           <a:lstStyle/>
           <a:p>
             <a:r>
-              <a:rPr lang="pt-BR" sz="1100" dirty="0" smtClean="0"/>
-              <a:t>+ getNomeSite(): String</a:t>
-            </a:r>
-          </a:p>
-          <a:p>
-            <a:r>
-              <a:rPr lang="pt-BR" sz="1100" dirty="0" smtClean="0"/>
-              <a:t>+ setNomeSite(String): void</a:t>
-            </a:r>
-          </a:p>
-          <a:p>
-            <a:r>
-              <a:rPr lang="pt-BR" sz="1100" dirty="0" smtClean="0"/>
-              <a:t>+ getTituloSite(): String</a:t>
-            </a:r>
-          </a:p>
-          <a:p>
-            <a:r>
-              <a:rPr lang="pt-BR" sz="1100" dirty="0" smtClean="0"/>
-              <a:t>+ setTituloSite(String): void</a:t>
-            </a:r>
-          </a:p>
-          <a:p>
-            <a:r>
-              <a:rPr lang="pt-BR" sz="1100" dirty="0" smtClean="0"/>
-              <a:t>+ getBannerSite(): String</a:t>
-            </a:r>
-          </a:p>
-          <a:p>
-            <a:r>
-              <a:rPr lang="pt-BR" sz="1100" dirty="0" smtClean="0"/>
-              <a:t>+ setBannerSite(String): void</a:t>
-            </a:r>
-          </a:p>
-          <a:p>
-            <a:r>
-              <a:rPr lang="pt-BR" sz="1100" dirty="0" smtClean="0"/>
-              <a:t>+ getModuloSite(int): int</a:t>
-            </a:r>
-          </a:p>
-          <a:p>
-            <a:r>
-              <a:rPr lang="pt-BR" sz="1100" smtClean="0"/>
+              <a:rPr lang="pt-BR" sz="1100" dirty="0"/>
               <a:t>+ </a:t>
             </a:r>
             <a:r>
-              <a:rPr lang="pt-BR" sz="1100" smtClean="0"/>
-              <a:t>setModuloSite(int, </a:t>
-            </a:r>
-            <a:r>
-              <a:rPr lang="pt-BR" sz="1100" dirty="0" smtClean="0"/>
-              <a:t>int): </a:t>
-            </a:r>
-            <a:r>
-              <a:rPr lang="pt-BR" sz="1100" dirty="0" smtClean="0"/>
-              <a:t>void</a:t>
-            </a:r>
-          </a:p>
-          <a:p>
-            <a:r>
-              <a:rPr lang="pt-BR" sz="1100" dirty="0" smtClean="0"/>
-              <a:t>+ getLayoutSite(): String</a:t>
-            </a:r>
-          </a:p>
-          <a:p>
-            <a:r>
-              <a:rPr lang="pt-BR" sz="1100" dirty="0" smtClean="0"/>
-              <a:t>+ setLayoutSite(int): void</a:t>
-            </a:r>
+              <a:rPr lang="pt-BR" sz="1100" dirty="0" err="1"/>
+              <a:t>PaginaCliente</a:t>
+            </a:r>
+            <a:r>
+              <a:rPr lang="pt-BR" sz="1100" dirty="0"/>
+              <a:t>()</a:t>
+            </a:r>
+          </a:p>
+          <a:p>
+            <a:r>
+              <a:rPr lang="pt-BR" sz="1100" dirty="0"/>
+              <a:t>+ </a:t>
+            </a:r>
+            <a:r>
+              <a:rPr lang="pt-BR" sz="1100" dirty="0" err="1"/>
+              <a:t>getNomeSite</a:t>
+            </a:r>
+            <a:r>
+              <a:rPr lang="pt-BR" sz="1100" dirty="0"/>
+              <a:t>()</a:t>
+            </a:r>
+          </a:p>
+          <a:p>
+            <a:r>
+              <a:rPr lang="pt-BR" sz="1100" dirty="0"/>
+              <a:t>+ </a:t>
+            </a:r>
+            <a:r>
+              <a:rPr lang="pt-BR" sz="1100" dirty="0" err="1"/>
+              <a:t>setNomeSite</a:t>
+            </a:r>
+            <a:r>
+              <a:rPr lang="pt-BR" sz="1100" dirty="0"/>
+              <a:t>(</a:t>
+            </a:r>
+            <a:r>
+              <a:rPr lang="pt-BR" sz="1100" dirty="0" err="1"/>
+              <a:t>String</a:t>
+            </a:r>
+            <a:r>
+              <a:rPr lang="pt-BR" sz="1100" dirty="0"/>
+              <a:t>)</a:t>
+            </a:r>
+          </a:p>
+          <a:p>
+            <a:r>
+              <a:rPr lang="pt-BR" sz="1100" dirty="0"/>
+              <a:t>+ </a:t>
+            </a:r>
+            <a:r>
+              <a:rPr lang="pt-BR" sz="1100" dirty="0" err="1"/>
+              <a:t>getTituloSite</a:t>
+            </a:r>
+            <a:r>
+              <a:rPr lang="pt-BR" sz="1100" dirty="0"/>
+              <a:t>()</a:t>
+            </a:r>
+          </a:p>
+          <a:p>
+            <a:r>
+              <a:rPr lang="pt-BR" sz="1100" dirty="0"/>
+              <a:t>+ </a:t>
+            </a:r>
+            <a:r>
+              <a:rPr lang="pt-BR" sz="1100" dirty="0" err="1"/>
+              <a:t>setTituloSite</a:t>
+            </a:r>
+            <a:r>
+              <a:rPr lang="pt-BR" sz="1100" dirty="0"/>
+              <a:t>(</a:t>
+            </a:r>
+            <a:r>
+              <a:rPr lang="pt-BR" sz="1100" dirty="0" err="1"/>
+              <a:t>String</a:t>
+            </a:r>
+            <a:r>
+              <a:rPr lang="pt-BR" sz="1100" dirty="0"/>
+              <a:t>)</a:t>
+            </a:r>
+          </a:p>
+          <a:p>
+            <a:r>
+              <a:rPr lang="pt-BR" sz="1100" dirty="0"/>
+              <a:t>+ </a:t>
+            </a:r>
+            <a:r>
+              <a:rPr lang="pt-BR" sz="1100" dirty="0" err="1"/>
+              <a:t>getBannerSite</a:t>
+            </a:r>
+            <a:r>
+              <a:rPr lang="pt-BR" sz="1100" dirty="0"/>
+              <a:t>()</a:t>
+            </a:r>
+          </a:p>
+          <a:p>
+            <a:r>
+              <a:rPr lang="pt-BR" sz="1100" dirty="0"/>
+              <a:t>+ </a:t>
+            </a:r>
+            <a:r>
+              <a:rPr lang="pt-BR" sz="1100" dirty="0" err="1"/>
+              <a:t>setBannerSite</a:t>
+            </a:r>
+            <a:r>
+              <a:rPr lang="pt-BR" sz="1100" dirty="0"/>
+              <a:t>(</a:t>
+            </a:r>
+            <a:r>
+              <a:rPr lang="pt-BR" sz="1100" dirty="0" err="1"/>
+              <a:t>String</a:t>
+            </a:r>
+            <a:r>
+              <a:rPr lang="pt-BR" sz="1100" dirty="0"/>
+              <a:t>)</a:t>
+            </a:r>
+          </a:p>
+          <a:p>
+            <a:r>
+              <a:rPr lang="pt-BR" sz="1100" dirty="0"/>
+              <a:t>+ </a:t>
+            </a:r>
+            <a:r>
+              <a:rPr lang="pt-BR" sz="1100" dirty="0" err="1"/>
+              <a:t>getGraduacao</a:t>
+            </a:r>
+            <a:r>
+              <a:rPr lang="pt-BR" sz="1100" dirty="0"/>
+              <a:t>()</a:t>
+            </a:r>
+          </a:p>
+          <a:p>
+            <a:r>
+              <a:rPr lang="pt-BR" sz="1100" dirty="0"/>
+              <a:t>+ </a:t>
+            </a:r>
+            <a:r>
+              <a:rPr lang="pt-BR" sz="1100" dirty="0" err="1"/>
+              <a:t>setGraduacao</a:t>
+            </a:r>
+            <a:r>
+              <a:rPr lang="pt-BR" sz="1100" dirty="0"/>
+              <a:t>(</a:t>
+            </a:r>
+            <a:r>
+              <a:rPr lang="pt-BR" sz="1100" dirty="0" err="1"/>
+              <a:t>int</a:t>
+            </a:r>
+            <a:r>
+              <a:rPr lang="pt-BR" sz="1100" dirty="0"/>
+              <a:t>)</a:t>
+            </a:r>
+          </a:p>
+          <a:p>
+            <a:r>
+              <a:rPr lang="pt-BR" sz="1100" dirty="0"/>
+              <a:t>+ </a:t>
+            </a:r>
+            <a:r>
+              <a:rPr lang="pt-BR" sz="1100" dirty="0" err="1"/>
+              <a:t>getPosGraduacao</a:t>
+            </a:r>
+            <a:r>
+              <a:rPr lang="pt-BR" sz="1100" dirty="0"/>
+              <a:t>()</a:t>
+            </a:r>
+          </a:p>
+          <a:p>
+            <a:r>
+              <a:rPr lang="pt-BR" sz="1100" dirty="0"/>
+              <a:t>+ </a:t>
+            </a:r>
+            <a:r>
+              <a:rPr lang="pt-BR" sz="1100" dirty="0" err="1"/>
+              <a:t>setPosGraduacao</a:t>
+            </a:r>
+            <a:r>
+              <a:rPr lang="pt-BR" sz="1100" dirty="0"/>
+              <a:t>(</a:t>
+            </a:r>
+            <a:r>
+              <a:rPr lang="pt-BR" sz="1100" dirty="0" err="1"/>
+              <a:t>int</a:t>
+            </a:r>
+            <a:r>
+              <a:rPr lang="pt-BR" sz="1100" dirty="0"/>
+              <a:t>)</a:t>
+            </a:r>
+          </a:p>
+          <a:p>
+            <a:r>
+              <a:rPr lang="pt-BR" sz="1100" dirty="0"/>
+              <a:t>+ </a:t>
+            </a:r>
+            <a:r>
+              <a:rPr lang="pt-BR" sz="1100" dirty="0" err="1"/>
+              <a:t>getMestrado</a:t>
+            </a:r>
+            <a:r>
+              <a:rPr lang="pt-BR" sz="1100" dirty="0"/>
+              <a:t>()</a:t>
+            </a:r>
+          </a:p>
+          <a:p>
+            <a:r>
+              <a:rPr lang="pt-BR" sz="1100" dirty="0"/>
+              <a:t>+ </a:t>
+            </a:r>
+            <a:r>
+              <a:rPr lang="pt-BR" sz="1100" dirty="0" err="1"/>
+              <a:t>setMestrado</a:t>
+            </a:r>
+            <a:r>
+              <a:rPr lang="pt-BR" sz="1100" dirty="0"/>
+              <a:t>(</a:t>
+            </a:r>
+            <a:r>
+              <a:rPr lang="pt-BR" sz="1100" dirty="0" err="1"/>
+              <a:t>int</a:t>
+            </a:r>
+            <a:r>
+              <a:rPr lang="pt-BR" sz="1100" dirty="0"/>
+              <a:t>)</a:t>
+            </a:r>
+          </a:p>
+          <a:p>
+            <a:r>
+              <a:rPr lang="pt-BR" sz="1100" dirty="0"/>
+              <a:t>+ </a:t>
+            </a:r>
+            <a:r>
+              <a:rPr lang="pt-BR" sz="1100" dirty="0" err="1"/>
+              <a:t>getDoutorado</a:t>
+            </a:r>
+            <a:r>
+              <a:rPr lang="pt-BR" sz="1100" dirty="0"/>
+              <a:t>()</a:t>
+            </a:r>
+          </a:p>
+          <a:p>
+            <a:r>
+              <a:rPr lang="pt-BR" sz="1100" dirty="0"/>
+              <a:t>+ </a:t>
+            </a:r>
+            <a:r>
+              <a:rPr lang="pt-BR" sz="1100" dirty="0" err="1"/>
+              <a:t>setDoutorado</a:t>
+            </a:r>
+            <a:r>
+              <a:rPr lang="pt-BR" sz="1100" dirty="0"/>
+              <a:t>(</a:t>
+            </a:r>
+            <a:r>
+              <a:rPr lang="pt-BR" sz="1100" dirty="0" err="1"/>
+              <a:t>int</a:t>
+            </a:r>
+            <a:r>
+              <a:rPr lang="pt-BR" sz="1100" dirty="0"/>
+              <a:t>)</a:t>
+            </a:r>
+          </a:p>
+          <a:p>
+            <a:r>
+              <a:rPr lang="pt-BR" sz="1100" dirty="0"/>
+              <a:t>+ </a:t>
+            </a:r>
+            <a:r>
+              <a:rPr lang="pt-BR" sz="1100" dirty="0" err="1"/>
+              <a:t>getLayoutSite</a:t>
+            </a:r>
+            <a:r>
+              <a:rPr lang="pt-BR" sz="1100" dirty="0"/>
+              <a:t>()</a:t>
+            </a:r>
+          </a:p>
+          <a:p>
+            <a:r>
+              <a:rPr lang="pt-BR" sz="1100" dirty="0"/>
+              <a:t>+ </a:t>
+            </a:r>
+            <a:r>
+              <a:rPr lang="pt-BR" sz="1100" dirty="0" err="1"/>
+              <a:t>setLayoutSite</a:t>
+            </a:r>
+            <a:r>
+              <a:rPr lang="pt-BR" sz="1100" dirty="0"/>
+              <a:t>(</a:t>
+            </a:r>
+            <a:r>
+              <a:rPr lang="pt-BR" sz="1100" dirty="0" err="1"/>
+              <a:t>int</a:t>
+            </a:r>
+            <a:r>
+              <a:rPr lang="pt-BR" sz="1100" dirty="0"/>
+              <a:t>)</a:t>
+            </a:r>
+            <a:endParaRPr lang="pt-BR" sz="1100" dirty="0" smtClean="0"/>
           </a:p>
         </p:txBody>
       </p:sp>
@@ -3520,18 +4205,18 @@
           <p:cNvPr id="21" name="Elbow Connector 20"/>
           <p:cNvCxnSpPr>
             <a:stCxn id="13" idx="1"/>
-            <a:endCxn id="5" idx="1"/>
+            <a:endCxn id="5" idx="3"/>
           </p:cNvCxnSpPr>
           <p:nvPr/>
         </p:nvCxnSpPr>
         <p:spPr>
           <a:xfrm rot="10800000">
-            <a:off x="683568" y="705313"/>
-            <a:ext cx="5112568" cy="1702364"/>
+            <a:off x="4003948" y="705313"/>
+            <a:ext cx="1792188" cy="734108"/>
           </a:xfrm>
           <a:prstGeom prst="bentConnector3">
             <a:avLst>
-              <a:gd name="adj1" fmla="val 104471"/>
+              <a:gd name="adj1" fmla="val 50000"/>
             </a:avLst>
           </a:prstGeom>
           <a:ln>
@@ -3564,6 +4249,13 @@
   <p:clrMapOvr>
     <a:masterClrMapping/>
   </p:clrMapOvr>
+  <p:timing>
+    <p:tnLst>
+      <p:par>
+        <p:cTn id="1" dur="indefinite" restart="never" nodeType="tmRoot"/>
+      </p:par>
+    </p:tnLst>
+  </p:timing>
 </p:sld>
 </file>
 

</xml_diff>